<commit_message>
La présentation du Projet surveillance system
</commit_message>
<xml_diff>
--- a/Projet surveillance system.pptx
+++ b/Projet surveillance system.pptx
@@ -51,13 +51,13 @@
       <p:bold r:id="rId34"/>
     </p:embeddedFont>
     <p:embeddedFont>
-      <p:font typeface="Bebas Neue" charset="0"/>
+      <p:font typeface="Golos Text" charset="0"/>
       <p:regular r:id="rId35"/>
+      <p:bold r:id="rId36"/>
     </p:embeddedFont>
     <p:embeddedFont>
-      <p:font typeface="Golos Text" charset="0"/>
-      <p:regular r:id="rId36"/>
-      <p:bold r:id="rId37"/>
+      <p:font typeface="Bebas Neue" charset="0"/>
+      <p:regular r:id="rId37"/>
     </p:embeddedFont>
   </p:embeddedFontLst>
   <p:defaultTextStyle>
@@ -291,7 +291,7 @@
   </p:defaultTextStyle>
   <p:extLst>
     <p:ext uri="{EFAFB233-063F-42B5-8137-9DF3F51BA10A}">
-      <p15:sldGuideLst xmlns:ahyp="http://schemas.microsoft.com/office/drawing/2018/hyperlinkcolor" xmlns:p15="http://schemas.microsoft.com/office/powerpoint/2012/main" xmlns:p14="http://schemas.microsoft.com/office/powerpoint/2010/main" xmlns:com="http://schemas.openxmlformats.org/drawingml/2006/compatibility" xmlns:pvml="urn:schemas-microsoft-com:office:powerpoint" xmlns:v="urn:schemas-microsoft-com:vml" xmlns:o="urn:schemas-microsoft-com:office:office" xmlns:dgm="http://schemas.openxmlformats.org/drawingml/2006/diagram" xmlns:c="http://schemas.openxmlformats.org/drawingml/2006/chart" xmlns:mv="urn:schemas-microsoft-com:mac:vml" xmlns:mc="http://schemas.openxmlformats.org/markup-compatibility/2006" xmlns="">
+      <p15:sldGuideLst xmlns="" xmlns:mc="http://schemas.openxmlformats.org/markup-compatibility/2006" xmlns:mv="urn:schemas-microsoft-com:mac:vml" xmlns:c="http://schemas.openxmlformats.org/drawingml/2006/chart" xmlns:dgm="http://schemas.openxmlformats.org/drawingml/2006/diagram" xmlns:o="urn:schemas-microsoft-com:office:office" xmlns:v="urn:schemas-microsoft-com:vml" xmlns:pvml="urn:schemas-microsoft-com:office:powerpoint" xmlns:com="http://schemas.openxmlformats.org/drawingml/2006/compatibility" xmlns:p14="http://schemas.microsoft.com/office/powerpoint/2010/main" xmlns:p15="http://schemas.microsoft.com/office/powerpoint/2012/main" xmlns:ahyp="http://schemas.microsoft.com/office/drawing/2018/hyperlinkcolor">
         <p15:guide id="1" orient="horz" pos="1620">
           <p15:clr>
             <a:srgbClr val="747775"/>
@@ -13977,15 +13977,7 @@
                   <a:schemeClr val="accent2"/>
                 </a:solidFill>
               </a:rPr>
-              <a:t>"</a:t>
-            </a:r>
-            <a:r>
-              <a:rPr lang="fr-FR" sz="1600" b="1" dirty="0" smtClean="0">
-                <a:solidFill>
-                  <a:schemeClr val="accent2"/>
-                </a:solidFill>
-              </a:rPr>
-              <a:t>Gold Tech Innovations"</a:t>
+              <a:t>"Gold Tech Innovations"</a:t>
             </a:r>
             <a:endParaRPr lang="fr-FR" sz="1600" b="1" dirty="0">
               <a:solidFill>
@@ -15725,7 +15717,11 @@
             </a:r>
             <a:r>
               <a:rPr lang="fr-FR" sz="2400" dirty="0" smtClean="0"/>
-              <a:t>module RFID.</a:t>
+              <a:t>module </a:t>
+            </a:r>
+            <a:r>
+              <a:rPr lang="fr-FR" sz="2400" dirty="0"/>
+              <a:t>de contrôle d'accès.</a:t>
             </a:r>
             <a:endParaRPr sz="2400" dirty="0"/>
           </a:p>
@@ -15790,7 +15786,7 @@
           <p:cNvPr id="7" name="Image 6" descr="Une image contenant texte, capture d’écran, Police, logo&#10;&#10;Le contenu généré par l’IA peut être incorrect.">
             <a:extLst>
               <a:ext uri="{FF2B5EF4-FFF2-40B4-BE49-F238E27FC236}">
-                <a16:creationId xmlns:lc="http://schemas.openxmlformats.org/drawingml/2006/lockedCanvas" xmlns:a16="http://schemas.microsoft.com/office/drawing/2014/main" xmlns="" id="{F7D18A81-CB33-E7A7-0B63-9491FCCF99FD}"/>
+                <a16:creationId xmlns="" xmlns:a16="http://schemas.microsoft.com/office/drawing/2014/main" xmlns:lc="http://schemas.openxmlformats.org/drawingml/2006/lockedCanvas" id="{F7D18A81-CB33-E7A7-0B63-9491FCCF99FD}"/>
               </a:ext>
             </a:extLst>
           </p:cNvPr>
@@ -15820,7 +15816,7 @@
           <p:cNvPr id="8" name="Image 7" descr="Une image contenant texte, capture d’écran, Police, conception&#10;&#10;Le contenu généré par l’IA peut être incorrect.">
             <a:extLst>
               <a:ext uri="{FF2B5EF4-FFF2-40B4-BE49-F238E27FC236}">
-                <a16:creationId xmlns:lc="http://schemas.openxmlformats.org/drawingml/2006/lockedCanvas" xmlns:a16="http://schemas.microsoft.com/office/drawing/2014/main" xmlns="" id="{30372B38-BE33-C9DD-84B6-48A3159C57B7}"/>
+                <a16:creationId xmlns="" xmlns:a16="http://schemas.microsoft.com/office/drawing/2014/main" xmlns:lc="http://schemas.openxmlformats.org/drawingml/2006/lockedCanvas" id="{30372B38-BE33-C9DD-84B6-48A3159C57B7}"/>
               </a:ext>
             </a:extLst>
           </p:cNvPr>
@@ -16011,13 +16007,8 @@
             <a:pPr lvl="0"/>
             <a:r>
               <a:rPr lang="fr-FR" dirty="0"/>
-              <a:t>Module </a:t>
+              <a:t>Module Atmosphérique</a:t>
             </a:r>
-            <a:r>
-              <a:rPr lang="fr-FR" dirty="0"/>
-              <a:t>Atmosphérique</a:t>
-            </a:r>
-            <a:endParaRPr lang="fr-FR" dirty="0"/>
           </a:p>
         </p:txBody>
       </p:sp>
@@ -18176,7 +18167,7 @@
       </p:grpSpPr>
       <p:pic>
         <p:nvPicPr>
-          <p:cNvPr id="4" name="Espace réservé pour une image  3"/>
+          <p:cNvPr id="6" name="Espace réservé pour une image  5"/>
           <p:cNvPicPr>
             <a:picLocks noGrp="1" noChangeAspect="1"/>
           </p:cNvPicPr>
@@ -18420,6 +18411,22 @@
               <a:rPr lang="fr-FR" dirty="0" err="1" smtClean="0"/>
               <a:t>Video</a:t>
             </a:r>
+            <a:r>
+              <a:rPr lang="fr-FR" dirty="0"/>
+              <a:t> (</a:t>
+            </a:r>
+            <a:r>
+              <a:rPr lang="fr-FR" dirty="0" err="1"/>
+              <a:t>google</a:t>
+            </a:r>
+            <a:r>
+              <a:rPr lang="fr-FR" dirty="0"/>
+              <a:t> </a:t>
+            </a:r>
+            <a:r>
+              <a:rPr lang="fr-FR" dirty="0" smtClean="0"/>
+              <a:t>drive)</a:t>
+            </a:r>
             <a:endParaRPr lang="fr-FR" dirty="0"/>
           </a:p>
         </p:txBody>
@@ -19091,11 +19098,7 @@
             </a:r>
             <a:r>
               <a:rPr lang="fr-FR"/>
-              <a:t>Capteurs </a:t>
-            </a:r>
-            <a:r>
-              <a:rPr lang="fr-FR"/>
-              <a:t>Atmosphérique</a:t>
+              <a:t>Capteurs Atmosphérique</a:t>
             </a:r>
             <a:endParaRPr lang="fr-FR" dirty="0"/>
           </a:p>
@@ -20390,7 +20393,7 @@
           <p:cNvPr id="9" name="Picture 2">
             <a:extLst>
               <a:ext uri="{FF2B5EF4-FFF2-40B4-BE49-F238E27FC236}">
-                <a16:creationId xmlns="" xmlns:a16="http://schemas.microsoft.com/office/drawing/2014/main" id="{B045ADE8-12E9-2A71-5406-2CCC0A974E3A}"/>
+                <a16:creationId xmlns:a16="http://schemas.microsoft.com/office/drawing/2014/main" xmlns="" id="{B045ADE8-12E9-2A71-5406-2CCC0A974E3A}"/>
               </a:ext>
             </a:extLst>
           </p:cNvPr>

</xml_diff>